<commit_message>
changed upload Button for Profile Pic
</commit_message>
<xml_diff>
--- a/Presentation LabChat - Exc 3.pptx
+++ b/Presentation LabChat - Exc 3.pptx
@@ -13,7 +13,8 @@
     <p:sldId id="267" r:id="rId7"/>
     <p:sldId id="268" r:id="rId8"/>
     <p:sldId id="269" r:id="rId9"/>
-    <p:sldId id="262" r:id="rId10"/>
+    <p:sldId id="270" r:id="rId10"/>
+    <p:sldId id="262" r:id="rId11"/>
   </p:sldIdLst>
   <p:sldSz cx="12192000" cy="6858000"/>
   <p:notesSz cx="6858000" cy="9144000"/>
@@ -267,7 +268,7 @@
           <a:p>
             <a:fld id="{10327095-FF13-41BF-8DF7-B30206B1C1FD}" type="datetimeFigureOut">
               <a:rPr lang="de-DE" smtClean="0"/>
-              <a:t>27.11.2018</a:t>
+              <a:t>28.11.2018</a:t>
             </a:fld>
             <a:endParaRPr lang="de-DE"/>
           </a:p>
@@ -465,7 +466,7 @@
           <a:p>
             <a:fld id="{10327095-FF13-41BF-8DF7-B30206B1C1FD}" type="datetimeFigureOut">
               <a:rPr lang="de-DE" smtClean="0"/>
-              <a:t>27.11.2018</a:t>
+              <a:t>28.11.2018</a:t>
             </a:fld>
             <a:endParaRPr lang="de-DE"/>
           </a:p>
@@ -673,7 +674,7 @@
           <a:p>
             <a:fld id="{10327095-FF13-41BF-8DF7-B30206B1C1FD}" type="datetimeFigureOut">
               <a:rPr lang="de-DE" smtClean="0"/>
-              <a:t>27.11.2018</a:t>
+              <a:t>28.11.2018</a:t>
             </a:fld>
             <a:endParaRPr lang="de-DE"/>
           </a:p>
@@ -871,7 +872,7 @@
           <a:p>
             <a:fld id="{10327095-FF13-41BF-8DF7-B30206B1C1FD}" type="datetimeFigureOut">
               <a:rPr lang="de-DE" smtClean="0"/>
-              <a:t>27.11.2018</a:t>
+              <a:t>28.11.2018</a:t>
             </a:fld>
             <a:endParaRPr lang="de-DE"/>
           </a:p>
@@ -1146,7 +1147,7 @@
           <a:p>
             <a:fld id="{10327095-FF13-41BF-8DF7-B30206B1C1FD}" type="datetimeFigureOut">
               <a:rPr lang="de-DE" smtClean="0"/>
-              <a:t>27.11.2018</a:t>
+              <a:t>28.11.2018</a:t>
             </a:fld>
             <a:endParaRPr lang="de-DE"/>
           </a:p>
@@ -1411,7 +1412,7 @@
           <a:p>
             <a:fld id="{10327095-FF13-41BF-8DF7-B30206B1C1FD}" type="datetimeFigureOut">
               <a:rPr lang="de-DE" smtClean="0"/>
-              <a:t>27.11.2018</a:t>
+              <a:t>28.11.2018</a:t>
             </a:fld>
             <a:endParaRPr lang="de-DE"/>
           </a:p>
@@ -1823,7 +1824,7 @@
           <a:p>
             <a:fld id="{10327095-FF13-41BF-8DF7-B30206B1C1FD}" type="datetimeFigureOut">
               <a:rPr lang="de-DE" smtClean="0"/>
-              <a:t>27.11.2018</a:t>
+              <a:t>28.11.2018</a:t>
             </a:fld>
             <a:endParaRPr lang="de-DE"/>
           </a:p>
@@ -1964,7 +1965,7 @@
           <a:p>
             <a:fld id="{10327095-FF13-41BF-8DF7-B30206B1C1FD}" type="datetimeFigureOut">
               <a:rPr lang="de-DE" smtClean="0"/>
-              <a:t>27.11.2018</a:t>
+              <a:t>28.11.2018</a:t>
             </a:fld>
             <a:endParaRPr lang="de-DE"/>
           </a:p>
@@ -2077,7 +2078,7 @@
           <a:p>
             <a:fld id="{10327095-FF13-41BF-8DF7-B30206B1C1FD}" type="datetimeFigureOut">
               <a:rPr lang="de-DE" smtClean="0"/>
-              <a:t>27.11.2018</a:t>
+              <a:t>28.11.2018</a:t>
             </a:fld>
             <a:endParaRPr lang="de-DE"/>
           </a:p>
@@ -2388,7 +2389,7 @@
           <a:p>
             <a:fld id="{10327095-FF13-41BF-8DF7-B30206B1C1FD}" type="datetimeFigureOut">
               <a:rPr lang="de-DE" smtClean="0"/>
-              <a:t>27.11.2018</a:t>
+              <a:t>28.11.2018</a:t>
             </a:fld>
             <a:endParaRPr lang="de-DE"/>
           </a:p>
@@ -2676,7 +2677,7 @@
           <a:p>
             <a:fld id="{10327095-FF13-41BF-8DF7-B30206B1C1FD}" type="datetimeFigureOut">
               <a:rPr lang="de-DE" smtClean="0"/>
-              <a:t>27.11.2018</a:t>
+              <a:t>28.11.2018</a:t>
             </a:fld>
             <a:endParaRPr lang="de-DE"/>
           </a:p>
@@ -2917,7 +2918,7 @@
           <a:p>
             <a:fld id="{10327095-FF13-41BF-8DF7-B30206B1C1FD}" type="datetimeFigureOut">
               <a:rPr lang="de-DE" smtClean="0"/>
-              <a:t>27.11.2018</a:t>
+              <a:t>28.11.2018</a:t>
             </a:fld>
             <a:endParaRPr lang="de-DE"/>
           </a:p>
@@ -3427,6 +3428,223 @@
 </p:sld>
 </file>
 
+<file path=ppt/slides/slide10.xml><?xml version="1.0" encoding="utf-8"?>
+<p:sld xmlns:a="http://schemas.openxmlformats.org/drawingml/2006/main" xmlns:r="http://schemas.openxmlformats.org/officeDocument/2006/relationships" xmlns:p="http://schemas.openxmlformats.org/presentationml/2006/main">
+  <p:cSld>
+    <p:spTree>
+      <p:nvGrpSpPr>
+        <p:cNvPr id="1" name=""/>
+        <p:cNvGrpSpPr/>
+        <p:nvPr/>
+      </p:nvGrpSpPr>
+      <p:grpSpPr>
+        <a:xfrm>
+          <a:off x="0" y="0"/>
+          <a:ext cx="0" cy="0"/>
+          <a:chOff x="0" y="0"/>
+          <a:chExt cx="0" cy="0"/>
+        </a:xfrm>
+      </p:grpSpPr>
+      <p:sp>
+        <p:nvSpPr>
+          <p:cNvPr id="2" name="Titel 1">
+            <a:extLst>
+              <a:ext uri="{FF2B5EF4-FFF2-40B4-BE49-F238E27FC236}">
+                <a16:creationId xmlns:a16="http://schemas.microsoft.com/office/drawing/2014/main" id="{DD98928F-9DEA-46B5-B112-04778A64A7F6}"/>
+              </a:ext>
+            </a:extLst>
+          </p:cNvPr>
+          <p:cNvSpPr>
+            <a:spLocks noGrp="1"/>
+          </p:cNvSpPr>
+          <p:nvPr>
+            <p:ph type="ctrTitle"/>
+          </p:nvPr>
+        </p:nvSpPr>
+        <p:spPr>
+          <a:xfrm>
+            <a:off x="202555" y="6250328"/>
+            <a:ext cx="1535575" cy="465821"/>
+          </a:xfrm>
+        </p:spPr>
+        <p:txBody>
+          <a:bodyPr>
+            <a:noAutofit/>
+          </a:bodyPr>
+          <a:lstStyle/>
+          <a:p>
+            <a:r>
+              <a:rPr lang="de-DE" sz="2000" dirty="0" err="1">
+                <a:solidFill>
+                  <a:srgbClr val="2C3E50"/>
+                </a:solidFill>
+                <a:latin typeface="Arial" panose="020B0604020202020204" pitchFamily="34" charset="0"/>
+                <a:ea typeface="Verdana" panose="020B0604030504040204" pitchFamily="34" charset="0"/>
+                <a:cs typeface="Arial" panose="020B0604020202020204" pitchFamily="34" charset="0"/>
+              </a:rPr>
+              <a:t>LabChat</a:t>
+            </a:r>
+            <a:endParaRPr lang="de-DE" sz="2000" dirty="0">
+              <a:solidFill>
+                <a:srgbClr val="2C3E50"/>
+              </a:solidFill>
+              <a:latin typeface="Arial" panose="020B0604020202020204" pitchFamily="34" charset="0"/>
+              <a:ea typeface="Verdana" panose="020B0604030504040204" pitchFamily="34" charset="0"/>
+              <a:cs typeface="Arial" panose="020B0604020202020204" pitchFamily="34" charset="0"/>
+            </a:endParaRPr>
+          </a:p>
+        </p:txBody>
+      </p:sp>
+      <p:sp>
+        <p:nvSpPr>
+          <p:cNvPr id="3" name="Untertitel 2">
+            <a:extLst>
+              <a:ext uri="{FF2B5EF4-FFF2-40B4-BE49-F238E27FC236}">
+                <a16:creationId xmlns:a16="http://schemas.microsoft.com/office/drawing/2014/main" id="{C45809FD-01F6-4C0E-B465-7B8F68958D5E}"/>
+              </a:ext>
+            </a:extLst>
+          </p:cNvPr>
+          <p:cNvSpPr>
+            <a:spLocks noGrp="1"/>
+          </p:cNvSpPr>
+          <p:nvPr>
+            <p:ph type="subTitle" idx="1"/>
+          </p:nvPr>
+        </p:nvSpPr>
+        <p:spPr>
+          <a:xfrm>
+            <a:off x="4369443" y="6250328"/>
+            <a:ext cx="8011610" cy="397015"/>
+          </a:xfrm>
+        </p:spPr>
+        <p:txBody>
+          <a:bodyPr>
+            <a:normAutofit fontScale="92500" lnSpcReduction="10000"/>
+          </a:bodyPr>
+          <a:lstStyle/>
+          <a:p>
+            <a:r>
+              <a:rPr lang="en-US" sz="2500" dirty="0"/>
+              <a:t>Hanna Schulze, Oliver Wagner //Cloud Computing WS 18/19</a:t>
+            </a:r>
+            <a:endParaRPr lang="de-DE" sz="2500" dirty="0"/>
+          </a:p>
+        </p:txBody>
+      </p:sp>
+      <p:sp>
+        <p:nvSpPr>
+          <p:cNvPr id="4" name="Textfeld 3">
+            <a:extLst>
+              <a:ext uri="{FF2B5EF4-FFF2-40B4-BE49-F238E27FC236}">
+                <a16:creationId xmlns:a16="http://schemas.microsoft.com/office/drawing/2014/main" id="{782AAED0-DC2A-4D84-9A4E-78FC3EC2034E}"/>
+              </a:ext>
+            </a:extLst>
+          </p:cNvPr>
+          <p:cNvSpPr txBox="1"/>
+          <p:nvPr/>
+        </p:nvSpPr>
+        <p:spPr>
+          <a:xfrm>
+            <a:off x="341453" y="335666"/>
+            <a:ext cx="7656653" cy="830997"/>
+          </a:xfrm>
+          <a:prstGeom prst="rect">
+            <a:avLst/>
+          </a:prstGeom>
+          <a:noFill/>
+        </p:spPr>
+        <p:txBody>
+          <a:bodyPr wrap="square" rtlCol="0">
+            <a:spAutoFit/>
+          </a:bodyPr>
+          <a:lstStyle/>
+          <a:p>
+            <a:r>
+              <a:rPr lang="en-US" sz="4800" dirty="0">
+                <a:latin typeface="+mj-lt"/>
+              </a:rPr>
+              <a:t>Live Demo</a:t>
+            </a:r>
+            <a:endParaRPr lang="de-DE" sz="4800" dirty="0">
+              <a:latin typeface="+mj-lt"/>
+            </a:endParaRPr>
+          </a:p>
+        </p:txBody>
+      </p:sp>
+      <p:sp>
+        <p:nvSpPr>
+          <p:cNvPr id="5" name="Textfeld 4">
+            <a:extLst>
+              <a:ext uri="{FF2B5EF4-FFF2-40B4-BE49-F238E27FC236}">
+                <a16:creationId xmlns:a16="http://schemas.microsoft.com/office/drawing/2014/main" id="{28A52866-EF96-4F86-8B15-A877A4BBA5A6}"/>
+              </a:ext>
+            </a:extLst>
+          </p:cNvPr>
+          <p:cNvSpPr txBox="1"/>
+          <p:nvPr/>
+        </p:nvSpPr>
+        <p:spPr>
+          <a:xfrm>
+            <a:off x="616405" y="2644170"/>
+            <a:ext cx="10981428" cy="1569660"/>
+          </a:xfrm>
+          <a:prstGeom prst="rect">
+            <a:avLst/>
+          </a:prstGeom>
+          <a:noFill/>
+        </p:spPr>
+        <p:txBody>
+          <a:bodyPr wrap="square" rtlCol="0">
+            <a:spAutoFit/>
+          </a:bodyPr>
+          <a:lstStyle/>
+          <a:p>
+            <a:r>
+              <a:rPr lang="en-US" sz="4800" dirty="0">
+                <a:solidFill>
+                  <a:schemeClr val="tx1">
+                    <a:lumMod val="95000"/>
+                    <a:lumOff val="5000"/>
+                  </a:schemeClr>
+                </a:solidFill>
+                <a:hlinkClick r:id="rId2"/>
+              </a:rPr>
+              <a:t>https://objective-euler.mybluemix.net/</a:t>
+            </a:r>
+            <a:endParaRPr lang="en-US" sz="4800" dirty="0">
+              <a:solidFill>
+                <a:schemeClr val="tx1">
+                  <a:lumMod val="95000"/>
+                  <a:lumOff val="5000"/>
+                </a:schemeClr>
+              </a:solidFill>
+            </a:endParaRPr>
+          </a:p>
+          <a:p>
+            <a:endParaRPr lang="de-DE" sz="4800" dirty="0">
+              <a:solidFill>
+                <a:schemeClr val="tx1">
+                  <a:lumMod val="95000"/>
+                  <a:lumOff val="5000"/>
+                </a:schemeClr>
+              </a:solidFill>
+            </a:endParaRPr>
+          </a:p>
+        </p:txBody>
+      </p:sp>
+    </p:spTree>
+    <p:extLst>
+      <p:ext uri="{BB962C8B-B14F-4D97-AF65-F5344CB8AC3E}">
+        <p14:creationId xmlns:p14="http://schemas.microsoft.com/office/powerpoint/2010/main" val="1616391531"/>
+      </p:ext>
+    </p:extLst>
+  </p:cSld>
+  <p:clrMapOvr>
+    <a:masterClrMapping/>
+  </p:clrMapOvr>
+</p:sld>
+</file>
+
 <file path=ppt/slides/slide2.xml><?xml version="1.0" encoding="utf-8"?>
 <p:sld xmlns:a="http://schemas.openxmlformats.org/drawingml/2006/main" xmlns:r="http://schemas.openxmlformats.org/officeDocument/2006/relationships" xmlns:p="http://schemas.openxmlformats.org/presentationml/2006/main">
   <p:cSld>
@@ -5089,31 +5307,416 @@
           </a:p>
         </p:txBody>
       </p:sp>
-      <p:sp>
-        <p:nvSpPr>
-          <p:cNvPr id="3" name="Inhaltsplatzhalter 2">
-            <a:extLst>
-              <a:ext uri="{FF2B5EF4-FFF2-40B4-BE49-F238E27FC236}">
-                <a16:creationId xmlns:a16="http://schemas.microsoft.com/office/drawing/2014/main" id="{80B390C9-79DD-4AA0-A65B-925B201F7FAC}"/>
-              </a:ext>
-            </a:extLst>
-          </p:cNvPr>
-          <p:cNvSpPr>
-            <a:spLocks noGrp="1"/>
-          </p:cNvSpPr>
+      <p:pic>
+        <p:nvPicPr>
+          <p:cNvPr id="9" name="Inhaltsplatzhalter 8">
+            <a:extLst>
+              <a:ext uri="{FF2B5EF4-FFF2-40B4-BE49-F238E27FC236}">
+                <a16:creationId xmlns:a16="http://schemas.microsoft.com/office/drawing/2014/main" id="{4052357B-6BA8-468C-9264-08407ED06643}"/>
+              </a:ext>
+            </a:extLst>
+          </p:cNvPr>
+          <p:cNvPicPr>
+            <a:picLocks noGrp="1" noChangeAspect="1"/>
+          </p:cNvPicPr>
           <p:nvPr>
             <p:ph idx="1"/>
           </p:nvPr>
-        </p:nvSpPr>
-        <p:spPr/>
-        <p:txBody>
-          <a:bodyPr/>
-          <a:lstStyle/>
-          <a:p>
-            <a:endParaRPr lang="de-DE"/>
-          </a:p>
-        </p:txBody>
-      </p:sp>
+        </p:nvPicPr>
+        <p:blipFill rotWithShape="1">
+          <a:blip r:embed="rId2">
+            <a:extLst>
+              <a:ext uri="{28A0092B-C50C-407E-A947-70E740481C1C}">
+                <a14:useLocalDpi xmlns:a14="http://schemas.microsoft.com/office/drawing/2010/main" val="0"/>
+              </a:ext>
+            </a:extLst>
+          </a:blip>
+          <a:srcRect l="24824" t="81251" b="13617"/>
+          <a:stretch/>
+        </p:blipFill>
+        <p:spPr>
+          <a:xfrm>
+            <a:off x="4300868" y="2164420"/>
+            <a:ext cx="7905206" cy="188622"/>
+          </a:xfrm>
+          <a:ln>
+            <a:solidFill>
+              <a:srgbClr val="FF0000"/>
+            </a:solidFill>
+          </a:ln>
+        </p:spPr>
+      </p:pic>
+      <p:pic>
+        <p:nvPicPr>
+          <p:cNvPr id="11" name="Grafik 10">
+            <a:extLst>
+              <a:ext uri="{FF2B5EF4-FFF2-40B4-BE49-F238E27FC236}">
+                <a16:creationId xmlns:a16="http://schemas.microsoft.com/office/drawing/2014/main" id="{AD064DC9-71E5-4781-8234-93CB7E9527F9}"/>
+              </a:ext>
+            </a:extLst>
+          </p:cNvPr>
+          <p:cNvPicPr>
+            <a:picLocks noChangeAspect="1"/>
+          </p:cNvPicPr>
+          <p:nvPr/>
+        </p:nvPicPr>
+        <p:blipFill>
+          <a:blip r:embed="rId3">
+            <a:extLst>
+              <a:ext uri="{28A0092B-C50C-407E-A947-70E740481C1C}">
+                <a14:useLocalDpi xmlns:a14="http://schemas.microsoft.com/office/drawing/2010/main" val="0"/>
+              </a:ext>
+            </a:extLst>
+          </a:blip>
+          <a:stretch>
+            <a:fillRect/>
+          </a:stretch>
+        </p:blipFill>
+        <p:spPr>
+          <a:xfrm>
+            <a:off x="838201" y="1512721"/>
+            <a:ext cx="3368040" cy="1526708"/>
+          </a:xfrm>
+          <a:prstGeom prst="rect">
+            <a:avLst/>
+          </a:prstGeom>
+        </p:spPr>
+      </p:pic>
+      <p:pic>
+        <p:nvPicPr>
+          <p:cNvPr id="13" name="Grafik 12">
+            <a:extLst>
+              <a:ext uri="{FF2B5EF4-FFF2-40B4-BE49-F238E27FC236}">
+                <a16:creationId xmlns:a16="http://schemas.microsoft.com/office/drawing/2014/main" id="{A632AE17-0276-4BDE-83D2-6FB512343284}"/>
+              </a:ext>
+            </a:extLst>
+          </p:cNvPr>
+          <p:cNvPicPr>
+            <a:picLocks noChangeAspect="1"/>
+          </p:cNvPicPr>
+          <p:nvPr/>
+        </p:nvPicPr>
+        <p:blipFill>
+          <a:blip r:embed="rId4">
+            <a:extLst>
+              <a:ext uri="{28A0092B-C50C-407E-A947-70E740481C1C}">
+                <a14:useLocalDpi xmlns:a14="http://schemas.microsoft.com/office/drawing/2010/main" val="0"/>
+              </a:ext>
+            </a:extLst>
+          </a:blip>
+          <a:stretch>
+            <a:fillRect/>
+          </a:stretch>
+        </p:blipFill>
+        <p:spPr>
+          <a:xfrm>
+            <a:off x="8302273" y="4685371"/>
+            <a:ext cx="3435201" cy="1465685"/>
+          </a:xfrm>
+          <a:prstGeom prst="rect">
+            <a:avLst/>
+          </a:prstGeom>
+        </p:spPr>
+      </p:pic>
+      <p:pic>
+        <p:nvPicPr>
+          <p:cNvPr id="20" name="Grafik 19">
+            <a:extLst>
+              <a:ext uri="{FF2B5EF4-FFF2-40B4-BE49-F238E27FC236}">
+                <a16:creationId xmlns:a16="http://schemas.microsoft.com/office/drawing/2014/main" id="{B875D251-6B7A-4601-B17E-26FD0F82F6CC}"/>
+              </a:ext>
+            </a:extLst>
+          </p:cNvPr>
+          <p:cNvPicPr>
+            <a:picLocks noChangeAspect="1"/>
+          </p:cNvPicPr>
+          <p:nvPr/>
+        </p:nvPicPr>
+        <p:blipFill rotWithShape="1">
+          <a:blip r:embed="rId5">
+            <a:extLst>
+              <a:ext uri="{28A0092B-C50C-407E-A947-70E740481C1C}">
+                <a14:useLocalDpi xmlns:a14="http://schemas.microsoft.com/office/drawing/2010/main" val="0"/>
+              </a:ext>
+            </a:extLst>
+          </a:blip>
+          <a:srcRect r="29383"/>
+          <a:stretch/>
+        </p:blipFill>
+        <p:spPr>
+          <a:xfrm>
+            <a:off x="668385" y="4578493"/>
+            <a:ext cx="4382588" cy="1679443"/>
+          </a:xfrm>
+          <a:prstGeom prst="rect">
+            <a:avLst/>
+          </a:prstGeom>
+        </p:spPr>
+      </p:pic>
+      <p:cxnSp>
+        <p:nvCxnSpPr>
+          <p:cNvPr id="22" name="Gerade Verbindung mit Pfeil 21">
+            <a:extLst>
+              <a:ext uri="{FF2B5EF4-FFF2-40B4-BE49-F238E27FC236}">
+                <a16:creationId xmlns:a16="http://schemas.microsoft.com/office/drawing/2014/main" id="{35D0AEA2-02DF-4595-9413-EB294706FDCE}"/>
+              </a:ext>
+            </a:extLst>
+          </p:cNvPr>
+          <p:cNvCxnSpPr>
+            <a:cxnSpLocks/>
+            <a:stCxn id="20" idx="3"/>
+            <a:endCxn id="13" idx="1"/>
+          </p:cNvCxnSpPr>
+          <p:nvPr/>
+        </p:nvCxnSpPr>
+        <p:spPr>
+          <a:xfrm flipV="1">
+            <a:off x="5050973" y="5418214"/>
+            <a:ext cx="3251300" cy="1"/>
+          </a:xfrm>
+          <a:prstGeom prst="straightConnector1">
+            <a:avLst/>
+          </a:prstGeom>
+          <a:ln>
+            <a:tailEnd type="triangle"/>
+          </a:ln>
+        </p:spPr>
+        <p:style>
+          <a:lnRef idx="1">
+            <a:schemeClr val="accent1"/>
+          </a:lnRef>
+          <a:fillRef idx="0">
+            <a:schemeClr val="accent1"/>
+          </a:fillRef>
+          <a:effectRef idx="0">
+            <a:schemeClr val="accent1"/>
+          </a:effectRef>
+          <a:fontRef idx="minor">
+            <a:schemeClr val="tx1"/>
+          </a:fontRef>
+        </p:style>
+      </p:cxnSp>
+      <p:sp>
+        <p:nvSpPr>
+          <p:cNvPr id="3" name="Textfeld 2">
+            <a:extLst>
+              <a:ext uri="{FF2B5EF4-FFF2-40B4-BE49-F238E27FC236}">
+                <a16:creationId xmlns:a16="http://schemas.microsoft.com/office/drawing/2014/main" id="{AD7BDF6B-67DC-4358-85FF-7132170176A9}"/>
+              </a:ext>
+            </a:extLst>
+          </p:cNvPr>
+          <p:cNvSpPr txBox="1"/>
+          <p:nvPr/>
+        </p:nvSpPr>
+        <p:spPr>
+          <a:xfrm>
+            <a:off x="5156978" y="5048931"/>
+            <a:ext cx="3039289" cy="307777"/>
+          </a:xfrm>
+          <a:prstGeom prst="rect">
+            <a:avLst/>
+          </a:prstGeom>
+          <a:noFill/>
+        </p:spPr>
+        <p:txBody>
+          <a:bodyPr wrap="square" rtlCol="0">
+            <a:spAutoFit/>
+          </a:bodyPr>
+          <a:lstStyle/>
+          <a:p>
+            <a:r>
+              <a:rPr lang="de-DE" sz="1400" dirty="0"/>
+              <a:t>if (</a:t>
+            </a:r>
+            <a:r>
+              <a:rPr lang="de-DE" sz="1400" dirty="0" err="1"/>
+              <a:t>response.image</a:t>
+            </a:r>
+            <a:r>
+              <a:rPr lang="de-DE" sz="1400" dirty="0"/>
+              <a:t>[0]</a:t>
+            </a:r>
+            <a:r>
+              <a:rPr lang="de-DE" sz="1400" dirty="0" err="1"/>
+              <a:t>faces.lenght</a:t>
+            </a:r>
+            <a:r>
+              <a:rPr lang="de-DE" sz="1400" dirty="0"/>
+              <a:t> &gt;= 0)</a:t>
+            </a:r>
+          </a:p>
+        </p:txBody>
+      </p:sp>
+      <p:sp>
+        <p:nvSpPr>
+          <p:cNvPr id="4" name="Textfeld 3">
+            <a:extLst>
+              <a:ext uri="{FF2B5EF4-FFF2-40B4-BE49-F238E27FC236}">
+                <a16:creationId xmlns:a16="http://schemas.microsoft.com/office/drawing/2014/main" id="{AA0F2895-0DC8-47D4-A62E-7D0812C7B1C8}"/>
+              </a:ext>
+            </a:extLst>
+          </p:cNvPr>
+          <p:cNvSpPr txBox="1"/>
+          <p:nvPr/>
+        </p:nvSpPr>
+        <p:spPr>
+          <a:xfrm>
+            <a:off x="2063931" y="3639814"/>
+            <a:ext cx="1908343" cy="369332"/>
+          </a:xfrm>
+          <a:prstGeom prst="rect">
+            <a:avLst/>
+          </a:prstGeom>
+          <a:noFill/>
+        </p:spPr>
+        <p:txBody>
+          <a:bodyPr wrap="none" rtlCol="0">
+            <a:spAutoFit/>
+          </a:bodyPr>
+          <a:lstStyle/>
+          <a:p>
+            <a:r>
+              <a:rPr lang="de-DE" dirty="0"/>
+              <a:t>Visual Recognition</a:t>
+            </a:r>
+          </a:p>
+        </p:txBody>
+      </p:sp>
+      <p:sp>
+        <p:nvSpPr>
+          <p:cNvPr id="7" name="Textfeld 6">
+            <a:extLst>
+              <a:ext uri="{FF2B5EF4-FFF2-40B4-BE49-F238E27FC236}">
+                <a16:creationId xmlns:a16="http://schemas.microsoft.com/office/drawing/2014/main" id="{9A81818D-491C-42F8-9F82-294551553484}"/>
+              </a:ext>
+            </a:extLst>
+          </p:cNvPr>
+          <p:cNvSpPr txBox="1"/>
+          <p:nvPr/>
+        </p:nvSpPr>
+        <p:spPr>
+          <a:xfrm>
+            <a:off x="3152503" y="2732210"/>
+            <a:ext cx="612000" cy="289240"/>
+          </a:xfrm>
+          <a:prstGeom prst="rect">
+            <a:avLst/>
+          </a:prstGeom>
+          <a:noFill/>
+          <a:ln>
+            <a:solidFill>
+              <a:srgbClr val="FF0000"/>
+            </a:solidFill>
+          </a:ln>
+        </p:spPr>
+        <p:style>
+          <a:lnRef idx="2">
+            <a:schemeClr val="accent1"/>
+          </a:lnRef>
+          <a:fillRef idx="1">
+            <a:schemeClr val="lt1"/>
+          </a:fillRef>
+          <a:effectRef idx="0">
+            <a:schemeClr val="accent1"/>
+          </a:effectRef>
+          <a:fontRef idx="minor">
+            <a:schemeClr val="dk1"/>
+          </a:fontRef>
+        </p:style>
+        <p:txBody>
+          <a:bodyPr wrap="square" rtlCol="0">
+            <a:spAutoFit/>
+          </a:bodyPr>
+          <a:lstStyle/>
+          <a:p>
+            <a:endParaRPr lang="de-DE" dirty="0"/>
+          </a:p>
+        </p:txBody>
+      </p:sp>
+      <p:cxnSp>
+        <p:nvCxnSpPr>
+          <p:cNvPr id="28" name="Verbinder: gewinkelt 27">
+            <a:extLst>
+              <a:ext uri="{FF2B5EF4-FFF2-40B4-BE49-F238E27FC236}">
+                <a16:creationId xmlns:a16="http://schemas.microsoft.com/office/drawing/2014/main" id="{546A5174-A3FD-4C53-BEFD-8EEE072AA0EF}"/>
+              </a:ext>
+            </a:extLst>
+          </p:cNvPr>
+          <p:cNvCxnSpPr>
+            <a:cxnSpLocks/>
+            <a:stCxn id="7" idx="2"/>
+            <a:endCxn id="9" idx="2"/>
+          </p:cNvCxnSpPr>
+          <p:nvPr/>
+        </p:nvCxnSpPr>
+        <p:spPr>
+          <a:xfrm rot="5400000" flipH="1" flipV="1">
+            <a:off x="5521783" y="289762"/>
+            <a:ext cx="668408" cy="4794968"/>
+          </a:xfrm>
+          <a:prstGeom prst="bentConnector3">
+            <a:avLst>
+              <a:gd name="adj1" fmla="val -30292"/>
+            </a:avLst>
+          </a:prstGeom>
+          <a:ln>
+            <a:tailEnd type="triangle"/>
+          </a:ln>
+        </p:spPr>
+        <p:style>
+          <a:lnRef idx="1">
+            <a:schemeClr val="accent1"/>
+          </a:lnRef>
+          <a:fillRef idx="0">
+            <a:schemeClr val="accent1"/>
+          </a:fillRef>
+          <a:effectRef idx="0">
+            <a:schemeClr val="accent1"/>
+          </a:effectRef>
+          <a:fontRef idx="minor">
+            <a:schemeClr val="tx1"/>
+          </a:fontRef>
+        </p:style>
+      </p:cxnSp>
+      <p:cxnSp>
+        <p:nvCxnSpPr>
+          <p:cNvPr id="40" name="Gerade Verbindung mit Pfeil 39">
+            <a:extLst>
+              <a:ext uri="{FF2B5EF4-FFF2-40B4-BE49-F238E27FC236}">
+                <a16:creationId xmlns:a16="http://schemas.microsoft.com/office/drawing/2014/main" id="{B7E76962-FC94-434F-B230-9C5161C3F279}"/>
+              </a:ext>
+            </a:extLst>
+          </p:cNvPr>
+          <p:cNvCxnSpPr/>
+          <p:nvPr/>
+        </p:nvCxnSpPr>
+        <p:spPr>
+          <a:xfrm>
+            <a:off x="2063931" y="3039429"/>
+            <a:ext cx="0" cy="1465530"/>
+          </a:xfrm>
+          <a:prstGeom prst="straightConnector1">
+            <a:avLst/>
+          </a:prstGeom>
+          <a:ln>
+            <a:tailEnd type="triangle"/>
+          </a:ln>
+        </p:spPr>
+        <p:style>
+          <a:lnRef idx="1">
+            <a:schemeClr val="accent1"/>
+          </a:lnRef>
+          <a:fillRef idx="0">
+            <a:schemeClr val="accent1"/>
+          </a:fillRef>
+          <a:effectRef idx="0">
+            <a:schemeClr val="accent1"/>
+          </a:effectRef>
+          <a:fontRef idx="minor">
+            <a:schemeClr val="tx1"/>
+          </a:fontRef>
+        </p:style>
+      </p:cxnSp>
     </p:spTree>
     <p:extLst>
       <p:ext uri="{BB962C8B-B14F-4D97-AF65-F5344CB8AC3E}">
@@ -5996,192 +6599,236 @@
           <p:cNvPr id="2" name="Titel 1">
             <a:extLst>
               <a:ext uri="{FF2B5EF4-FFF2-40B4-BE49-F238E27FC236}">
-                <a16:creationId xmlns:a16="http://schemas.microsoft.com/office/drawing/2014/main" id="{DD98928F-9DEA-46B5-B112-04778A64A7F6}"/>
-              </a:ext>
-            </a:extLst>
-          </p:cNvPr>
-          <p:cNvSpPr>
-            <a:spLocks noGrp="1"/>
-          </p:cNvSpPr>
-          <p:nvPr>
-            <p:ph type="ctrTitle"/>
-          </p:nvPr>
-        </p:nvSpPr>
-        <p:spPr>
-          <a:xfrm>
-            <a:off x="202555" y="6250328"/>
-            <a:ext cx="1535575" cy="465821"/>
-          </a:xfrm>
-        </p:spPr>
-        <p:txBody>
-          <a:bodyPr>
-            <a:noAutofit/>
-          </a:bodyPr>
-          <a:lstStyle/>
-          <a:p>
-            <a:r>
-              <a:rPr lang="de-DE" sz="2000" dirty="0" err="1">
-                <a:solidFill>
-                  <a:srgbClr val="2C3E50"/>
-                </a:solidFill>
-                <a:latin typeface="Arial" panose="020B0604020202020204" pitchFamily="34" charset="0"/>
-                <a:ea typeface="Verdana" panose="020B0604030504040204" pitchFamily="34" charset="0"/>
-                <a:cs typeface="Arial" panose="020B0604020202020204" pitchFamily="34" charset="0"/>
-              </a:rPr>
-              <a:t>LabChat</a:t>
-            </a:r>
-            <a:endParaRPr lang="de-DE" sz="2000" dirty="0">
-              <a:solidFill>
-                <a:srgbClr val="2C3E50"/>
-              </a:solidFill>
-              <a:latin typeface="Arial" panose="020B0604020202020204" pitchFamily="34" charset="0"/>
-              <a:ea typeface="Verdana" panose="020B0604030504040204" pitchFamily="34" charset="0"/>
-              <a:cs typeface="Arial" panose="020B0604020202020204" pitchFamily="34" charset="0"/>
-            </a:endParaRPr>
-          </a:p>
-        </p:txBody>
-      </p:sp>
-      <p:sp>
-        <p:nvSpPr>
-          <p:cNvPr id="3" name="Untertitel 2">
-            <a:extLst>
-              <a:ext uri="{FF2B5EF4-FFF2-40B4-BE49-F238E27FC236}">
-                <a16:creationId xmlns:a16="http://schemas.microsoft.com/office/drawing/2014/main" id="{C45809FD-01F6-4C0E-B465-7B8F68958D5E}"/>
-              </a:ext>
-            </a:extLst>
-          </p:cNvPr>
-          <p:cNvSpPr>
-            <a:spLocks noGrp="1"/>
-          </p:cNvSpPr>
-          <p:nvPr>
-            <p:ph type="subTitle" idx="1"/>
-          </p:nvPr>
-        </p:nvSpPr>
-        <p:spPr>
-          <a:xfrm>
-            <a:off x="4369443" y="6250328"/>
-            <a:ext cx="8011610" cy="397015"/>
-          </a:xfrm>
-        </p:spPr>
-        <p:txBody>
-          <a:bodyPr>
-            <a:normAutofit fontScale="92500" lnSpcReduction="10000"/>
-          </a:bodyPr>
-          <a:lstStyle/>
-          <a:p>
-            <a:r>
-              <a:rPr lang="en-US" sz="2500" dirty="0"/>
-              <a:t>Hanna Schulze, Oliver Wagner //Cloud Computing WS 18/19</a:t>
-            </a:r>
-            <a:endParaRPr lang="de-DE" sz="2500" dirty="0"/>
-          </a:p>
-        </p:txBody>
-      </p:sp>
-      <p:sp>
-        <p:nvSpPr>
-          <p:cNvPr id="4" name="Textfeld 3">
-            <a:extLst>
-              <a:ext uri="{FF2B5EF4-FFF2-40B4-BE49-F238E27FC236}">
-                <a16:creationId xmlns:a16="http://schemas.microsoft.com/office/drawing/2014/main" id="{782AAED0-DC2A-4D84-9A4E-78FC3EC2034E}"/>
-              </a:ext>
-            </a:extLst>
-          </p:cNvPr>
-          <p:cNvSpPr txBox="1"/>
-          <p:nvPr/>
-        </p:nvSpPr>
-        <p:spPr>
-          <a:xfrm>
-            <a:off x="341453" y="335666"/>
-            <a:ext cx="7656653" cy="830997"/>
-          </a:xfrm>
-          <a:prstGeom prst="rect">
-            <a:avLst/>
-          </a:prstGeom>
-          <a:noFill/>
-        </p:spPr>
-        <p:txBody>
-          <a:bodyPr wrap="square" rtlCol="0">
-            <a:spAutoFit/>
-          </a:bodyPr>
-          <a:lstStyle/>
-          <a:p>
-            <a:r>
-              <a:rPr lang="en-US" sz="4800" dirty="0">
-                <a:latin typeface="+mj-lt"/>
-              </a:rPr>
-              <a:t>Live Demo</a:t>
-            </a:r>
-            <a:endParaRPr lang="de-DE" sz="4800" dirty="0">
-              <a:latin typeface="+mj-lt"/>
-            </a:endParaRPr>
-          </a:p>
-        </p:txBody>
-      </p:sp>
-      <p:sp>
-        <p:nvSpPr>
-          <p:cNvPr id="5" name="Textfeld 4">
-            <a:extLst>
-              <a:ext uri="{FF2B5EF4-FFF2-40B4-BE49-F238E27FC236}">
-                <a16:creationId xmlns:a16="http://schemas.microsoft.com/office/drawing/2014/main" id="{28A52866-EF96-4F86-8B15-A877A4BBA5A6}"/>
-              </a:ext>
-            </a:extLst>
-          </p:cNvPr>
-          <p:cNvSpPr txBox="1"/>
-          <p:nvPr/>
-        </p:nvSpPr>
-        <p:spPr>
-          <a:xfrm>
-            <a:off x="616405" y="2644170"/>
-            <a:ext cx="10981428" cy="1569660"/>
-          </a:xfrm>
-          <a:prstGeom prst="rect">
-            <a:avLst/>
-          </a:prstGeom>
-          <a:noFill/>
-        </p:spPr>
-        <p:txBody>
-          <a:bodyPr wrap="square" rtlCol="0">
-            <a:spAutoFit/>
-          </a:bodyPr>
-          <a:lstStyle/>
-          <a:p>
-            <a:r>
-              <a:rPr lang="en-US" sz="4800" dirty="0">
-                <a:solidFill>
-                  <a:schemeClr val="tx1">
-                    <a:lumMod val="95000"/>
-                    <a:lumOff val="5000"/>
-                  </a:schemeClr>
-                </a:solidFill>
-                <a:hlinkClick r:id="rId2"/>
-              </a:rPr>
-              <a:t>https://objective-euler.mybluemix.net/</a:t>
-            </a:r>
-            <a:endParaRPr lang="en-US" sz="4800" dirty="0">
-              <a:solidFill>
-                <a:schemeClr val="tx1">
-                  <a:lumMod val="95000"/>
-                  <a:lumOff val="5000"/>
-                </a:schemeClr>
-              </a:solidFill>
-            </a:endParaRPr>
-          </a:p>
-          <a:p>
-            <a:endParaRPr lang="de-DE" sz="4800" dirty="0">
-              <a:solidFill>
-                <a:schemeClr val="tx1">
-                  <a:lumMod val="95000"/>
-                  <a:lumOff val="5000"/>
-                </a:schemeClr>
-              </a:solidFill>
-            </a:endParaRPr>
+                <a16:creationId xmlns:a16="http://schemas.microsoft.com/office/drawing/2014/main" id="{D8D999FD-26AC-418F-ABEC-810B79778B3D}"/>
+              </a:ext>
+            </a:extLst>
+          </p:cNvPr>
+          <p:cNvSpPr>
+            <a:spLocks noGrp="1"/>
+          </p:cNvSpPr>
+          <p:nvPr>
+            <p:ph type="title"/>
+          </p:nvPr>
+        </p:nvSpPr>
+        <p:spPr/>
+        <p:txBody>
+          <a:bodyPr/>
+          <a:lstStyle/>
+          <a:p>
+            <a:r>
+              <a:rPr lang="de-DE" dirty="0" err="1"/>
+              <a:t>Lesson</a:t>
+            </a:r>
+            <a:r>
+              <a:rPr lang="de-DE" dirty="0"/>
+              <a:t> </a:t>
+            </a:r>
+            <a:r>
+              <a:rPr lang="de-DE" dirty="0" err="1"/>
+              <a:t>learnt</a:t>
+            </a:r>
+            <a:endParaRPr lang="de-DE" dirty="0"/>
+          </a:p>
+        </p:txBody>
+      </p:sp>
+      <p:sp>
+        <p:nvSpPr>
+          <p:cNvPr id="3" name="Inhaltsplatzhalter 2">
+            <a:extLst>
+              <a:ext uri="{FF2B5EF4-FFF2-40B4-BE49-F238E27FC236}">
+                <a16:creationId xmlns:a16="http://schemas.microsoft.com/office/drawing/2014/main" id="{AC8BA09D-11AD-46F3-B579-F8F74F84A797}"/>
+              </a:ext>
+            </a:extLst>
+          </p:cNvPr>
+          <p:cNvSpPr>
+            <a:spLocks noGrp="1"/>
+          </p:cNvSpPr>
+          <p:nvPr>
+            <p:ph idx="1"/>
+          </p:nvPr>
+        </p:nvSpPr>
+        <p:spPr/>
+        <p:txBody>
+          <a:bodyPr/>
+          <a:lstStyle/>
+          <a:p>
+            <a:r>
+              <a:rPr lang="de-DE" sz="3200" dirty="0" err="1"/>
+              <a:t>Connecting</a:t>
+            </a:r>
+            <a:r>
+              <a:rPr lang="de-DE" sz="3200" dirty="0"/>
+              <a:t> </a:t>
+            </a:r>
+            <a:r>
+              <a:rPr lang="de-DE" sz="3200" dirty="0" err="1"/>
+              <a:t>cloud</a:t>
+            </a:r>
+            <a:r>
+              <a:rPr lang="de-DE" sz="3200" dirty="0"/>
+              <a:t> </a:t>
+            </a:r>
+            <a:r>
+              <a:rPr lang="de-DE" sz="3200" dirty="0" err="1"/>
+              <a:t>services</a:t>
+            </a:r>
+            <a:endParaRPr lang="de-DE" sz="3200" dirty="0"/>
+          </a:p>
+          <a:p>
+            <a:endParaRPr lang="de-DE" sz="3200" dirty="0"/>
+          </a:p>
+          <a:p>
+            <a:pPr marL="0" indent="0">
+              <a:buNone/>
+            </a:pPr>
+            <a:endParaRPr lang="de-DE" sz="3200" dirty="0"/>
+          </a:p>
+          <a:p>
+            <a:r>
+              <a:rPr lang="de-DE" sz="3200" dirty="0" err="1"/>
+              <a:t>Connecting</a:t>
+            </a:r>
+            <a:r>
+              <a:rPr lang="de-DE" sz="3200" dirty="0"/>
+              <a:t> a </a:t>
+            </a:r>
+            <a:r>
+              <a:rPr lang="de-DE" sz="3200" dirty="0" err="1"/>
+              <a:t>CloudSQL</a:t>
+            </a:r>
+            <a:r>
+              <a:rPr lang="de-DE" sz="3200" dirty="0"/>
+              <a:t> </a:t>
+            </a:r>
+            <a:r>
+              <a:rPr lang="de-DE" sz="3200" dirty="0" err="1"/>
+              <a:t>database</a:t>
+            </a:r>
+            <a:r>
+              <a:rPr lang="de-DE" sz="3200" dirty="0"/>
+              <a:t> </a:t>
+            </a:r>
+            <a:r>
+              <a:rPr lang="de-DE" sz="3200" dirty="0" err="1"/>
+              <a:t>with</a:t>
+            </a:r>
+            <a:r>
+              <a:rPr lang="de-DE" sz="3200" dirty="0"/>
+              <a:t> a Node </a:t>
+            </a:r>
+            <a:r>
+              <a:rPr lang="de-DE" sz="3200" dirty="0" err="1"/>
+              <a:t>application</a:t>
+            </a:r>
+            <a:r>
+              <a:rPr lang="de-DE" sz="3200" dirty="0"/>
+              <a:t>,</a:t>
+            </a:r>
+            <a:br>
+              <a:rPr lang="de-DE" sz="3200" dirty="0"/>
+            </a:br>
+            <a:r>
+              <a:rPr lang="de-DE" sz="3200" dirty="0" err="1"/>
+              <a:t>sending</a:t>
+            </a:r>
+            <a:r>
+              <a:rPr lang="de-DE" sz="3200" dirty="0"/>
+              <a:t> and </a:t>
+            </a:r>
+            <a:r>
+              <a:rPr lang="de-DE" sz="3200" dirty="0" err="1"/>
+              <a:t>receiving</a:t>
+            </a:r>
+            <a:r>
+              <a:rPr lang="de-DE" sz="3200" dirty="0"/>
+              <a:t> </a:t>
+            </a:r>
+            <a:r>
+              <a:rPr lang="de-DE" sz="3200" dirty="0" err="1"/>
+              <a:t>data</a:t>
+            </a:r>
+            <a:r>
+              <a:rPr lang="de-DE" sz="3200" dirty="0"/>
+              <a:t> from and to </a:t>
+            </a:r>
+            <a:r>
+              <a:rPr lang="de-DE" sz="3200" dirty="0" err="1"/>
+              <a:t>the</a:t>
+            </a:r>
+            <a:r>
+              <a:rPr lang="de-DE" sz="3200" dirty="0"/>
+              <a:t> </a:t>
+            </a:r>
+            <a:r>
+              <a:rPr lang="de-DE" sz="3200" dirty="0" err="1"/>
+              <a:t>database</a:t>
+            </a:r>
+            <a:endParaRPr lang="de-DE" sz="3200" dirty="0"/>
+          </a:p>
+          <a:p>
+            <a:r>
+              <a:rPr lang="de-DE" sz="3200" dirty="0" err="1"/>
+              <a:t>Using</a:t>
+            </a:r>
+            <a:r>
+              <a:rPr lang="de-DE" sz="3200" dirty="0"/>
+              <a:t> </a:t>
+            </a:r>
+            <a:r>
+              <a:rPr lang="de-DE" sz="3200" dirty="0" err="1"/>
+              <a:t>deprecated</a:t>
+            </a:r>
+            <a:r>
+              <a:rPr lang="de-DE" sz="3200" dirty="0"/>
+              <a:t> </a:t>
+            </a:r>
+            <a:r>
+              <a:rPr lang="de-DE" sz="3200" dirty="0" err="1"/>
+              <a:t>cloud</a:t>
+            </a:r>
+            <a:r>
+              <a:rPr lang="de-DE" sz="3200" dirty="0"/>
+              <a:t> </a:t>
+            </a:r>
+            <a:r>
+              <a:rPr lang="de-DE" sz="3200" dirty="0" err="1"/>
+              <a:t>services</a:t>
+            </a:r>
+            <a:r>
+              <a:rPr lang="de-DE" sz="3200" dirty="0"/>
+              <a:t> </a:t>
+            </a:r>
+            <a:r>
+              <a:rPr lang="de-DE" sz="3200" dirty="0" err="1"/>
+              <a:t>can</a:t>
+            </a:r>
+            <a:r>
+              <a:rPr lang="de-DE" sz="3200" dirty="0"/>
+              <a:t> </a:t>
+            </a:r>
+            <a:r>
+              <a:rPr lang="de-DE" sz="3200" dirty="0" err="1"/>
+              <a:t>be</a:t>
+            </a:r>
+            <a:r>
+              <a:rPr lang="de-DE" sz="3200" dirty="0"/>
+              <a:t> </a:t>
+            </a:r>
+            <a:r>
+              <a:rPr lang="de-DE" sz="3200" dirty="0" err="1"/>
+              <a:t>tricky</a:t>
+            </a:r>
+            <a:endParaRPr lang="de-DE" sz="3200" dirty="0"/>
+          </a:p>
+          <a:p>
+            <a:endParaRPr lang="de-DE" dirty="0"/>
           </a:p>
         </p:txBody>
       </p:sp>
     </p:spTree>
     <p:extLst>
       <p:ext uri="{BB962C8B-B14F-4D97-AF65-F5344CB8AC3E}">
-        <p14:creationId xmlns:p14="http://schemas.microsoft.com/office/powerpoint/2010/main" val="1616391531"/>
+        <p14:creationId xmlns:p14="http://schemas.microsoft.com/office/powerpoint/2010/main" val="1309908323"/>
       </p:ext>
     </p:extLst>
   </p:cSld>

</xml_diff>